<commit_message>
Got a lot of canvas tests working. Thinking about ways to mae testing easier - hence checkpoint.
</commit_message>
<xml_diff>
--- a/TestModelStructure.pptx
+++ b/TestModelStructure.pptx
@@ -289,7 +289,7 @@
             <a:fld id="{CC7D4371-02AB-6D40-8AD7-E96C8B985ABA}" type="datetimeFigureOut">
               <a:rPr lang="en-US" smtClean="0"/>
               <a:pPr/>
-              <a:t>8/17/10</a:t>
+              <a:t>8/18/10</a:t>
             </a:fld>
             <a:endParaRPr lang="en-GB"/>
           </a:p>
@@ -456,7 +456,7 @@
             <a:fld id="{CC7D4371-02AB-6D40-8AD7-E96C8B985ABA}" type="datetimeFigureOut">
               <a:rPr lang="en-US" smtClean="0"/>
               <a:pPr/>
-              <a:t>8/17/10</a:t>
+              <a:t>8/18/10</a:t>
             </a:fld>
             <a:endParaRPr lang="en-GB"/>
           </a:p>
@@ -633,7 +633,7 @@
             <a:fld id="{CC7D4371-02AB-6D40-8AD7-E96C8B985ABA}" type="datetimeFigureOut">
               <a:rPr lang="en-US" smtClean="0"/>
               <a:pPr/>
-              <a:t>8/17/10</a:t>
+              <a:t>8/18/10</a:t>
             </a:fld>
             <a:endParaRPr lang="en-GB"/>
           </a:p>
@@ -800,7 +800,7 @@
             <a:fld id="{CC7D4371-02AB-6D40-8AD7-E96C8B985ABA}" type="datetimeFigureOut">
               <a:rPr lang="en-US" smtClean="0"/>
               <a:pPr/>
-              <a:t>8/17/10</a:t>
+              <a:t>8/18/10</a:t>
             </a:fld>
             <a:endParaRPr lang="en-GB"/>
           </a:p>
@@ -1043,7 +1043,7 @@
             <a:fld id="{CC7D4371-02AB-6D40-8AD7-E96C8B985ABA}" type="datetimeFigureOut">
               <a:rPr lang="en-US" smtClean="0"/>
               <a:pPr/>
-              <a:t>8/17/10</a:t>
+              <a:t>8/18/10</a:t>
             </a:fld>
             <a:endParaRPr lang="en-GB"/>
           </a:p>
@@ -1328,7 +1328,7 @@
             <a:fld id="{CC7D4371-02AB-6D40-8AD7-E96C8B985ABA}" type="datetimeFigureOut">
               <a:rPr lang="en-US" smtClean="0"/>
               <a:pPr/>
-              <a:t>8/17/10</a:t>
+              <a:t>8/18/10</a:t>
             </a:fld>
             <a:endParaRPr lang="en-GB"/>
           </a:p>
@@ -1747,7 +1747,7 @@
             <a:fld id="{CC7D4371-02AB-6D40-8AD7-E96C8B985ABA}" type="datetimeFigureOut">
               <a:rPr lang="en-US" smtClean="0"/>
               <a:pPr/>
-              <a:t>8/17/10</a:t>
+              <a:t>8/18/10</a:t>
             </a:fld>
             <a:endParaRPr lang="en-GB"/>
           </a:p>
@@ -1862,7 +1862,7 @@
             <a:fld id="{CC7D4371-02AB-6D40-8AD7-E96C8B985ABA}" type="datetimeFigureOut">
               <a:rPr lang="en-US" smtClean="0"/>
               <a:pPr/>
-              <a:t>8/17/10</a:t>
+              <a:t>8/18/10</a:t>
             </a:fld>
             <a:endParaRPr lang="en-GB"/>
           </a:p>
@@ -1954,7 +1954,7 @@
             <a:fld id="{CC7D4371-02AB-6D40-8AD7-E96C8B985ABA}" type="datetimeFigureOut">
               <a:rPr lang="en-US" smtClean="0"/>
               <a:pPr/>
-              <a:t>8/17/10</a:t>
+              <a:t>8/18/10</a:t>
             </a:fld>
             <a:endParaRPr lang="en-GB"/>
           </a:p>
@@ -2228,7 +2228,7 @@
             <a:fld id="{CC7D4371-02AB-6D40-8AD7-E96C8B985ABA}" type="datetimeFigureOut">
               <a:rPr lang="en-US" smtClean="0"/>
               <a:pPr/>
-              <a:t>8/17/10</a:t>
+              <a:t>8/18/10</a:t>
             </a:fld>
             <a:endParaRPr lang="en-GB"/>
           </a:p>
@@ -2478,7 +2478,7 @@
             <a:fld id="{CC7D4371-02AB-6D40-8AD7-E96C8B985ABA}" type="datetimeFigureOut">
               <a:rPr lang="en-US" smtClean="0"/>
               <a:pPr/>
-              <a:t>8/17/10</a:t>
+              <a:t>8/18/10</a:t>
             </a:fld>
             <a:endParaRPr lang="en-GB"/>
           </a:p>
@@ -2688,7 +2688,7 @@
             <a:fld id="{CC7D4371-02AB-6D40-8AD7-E96C8B985ABA}" type="datetimeFigureOut">
               <a:rPr lang="en-US" smtClean="0"/>
               <a:pPr/>
-              <a:t>8/17/10</a:t>
+              <a:t>8/18/10</a:t>
             </a:fld>
             <a:endParaRPr lang="en-GB"/>
           </a:p>
@@ -3139,11 +3139,7 @@
             <a:pPr algn="ctr"/>
             <a:r>
               <a:rPr lang="en-GB" dirty="0" smtClean="0"/>
-              <a:t>S</a:t>
-            </a:r>
-            <a:r>
-              <a:rPr lang="en-GB" dirty="0" smtClean="0"/>
-              <a:t>1</a:t>
+              <a:t>S1</a:t>
             </a:r>
             <a:endParaRPr lang="en-GB" dirty="0"/>
           </a:p>
@@ -3186,11 +3182,7 @@
             <a:pPr algn="ctr"/>
             <a:r>
               <a:rPr lang="en-GB" dirty="0" smtClean="0"/>
-              <a:t>S</a:t>
-            </a:r>
-            <a:r>
-              <a:rPr lang="en-GB" dirty="0" smtClean="0"/>
-              <a:t>4</a:t>
+              <a:t>S4</a:t>
             </a:r>
             <a:endParaRPr lang="en-GB" dirty="0"/>
           </a:p>
@@ -3233,11 +3225,7 @@
             <a:pPr algn="ctr"/>
             <a:r>
               <a:rPr lang="en-GB" dirty="0" smtClean="0"/>
-              <a:t>S</a:t>
-            </a:r>
-            <a:r>
-              <a:rPr lang="en-GB" dirty="0" smtClean="0"/>
-              <a:t>2</a:t>
+              <a:t>S2</a:t>
             </a:r>
             <a:endParaRPr lang="en-GB" dirty="0"/>
           </a:p>
@@ -3280,11 +3268,7 @@
             <a:pPr algn="ctr"/>
             <a:r>
               <a:rPr lang="en-GB" dirty="0" smtClean="0"/>
-              <a:t>L</a:t>
-            </a:r>
-            <a:r>
-              <a:rPr lang="en-GB" dirty="0" smtClean="0"/>
-              <a:t>1</a:t>
+              <a:t>L1</a:t>
             </a:r>
             <a:endParaRPr lang="en-GB" dirty="0"/>
           </a:p>
@@ -3382,11 +3366,7 @@
             <a:pPr algn="ctr"/>
             <a:r>
               <a:rPr lang="en-GB" dirty="0" smtClean="0"/>
-              <a:t>L</a:t>
-            </a:r>
-            <a:r>
-              <a:rPr lang="en-GB" dirty="0" smtClean="0"/>
-              <a:t>3</a:t>
+              <a:t>L3</a:t>
             </a:r>
             <a:endParaRPr lang="en-GB" dirty="0">
               <a:solidFill>
@@ -3433,11 +3413,7 @@
             <a:pPr algn="ctr"/>
             <a:r>
               <a:rPr lang="en-GB" dirty="0" smtClean="0"/>
-              <a:t>S</a:t>
-            </a:r>
-            <a:r>
-              <a:rPr lang="en-GB" dirty="0" smtClean="0"/>
-              <a:t>6</a:t>
+              <a:t>S6</a:t>
             </a:r>
             <a:endParaRPr lang="en-GB" dirty="0"/>
           </a:p>
@@ -3480,11 +3456,7 @@
             <a:pPr algn="ctr"/>
             <a:r>
               <a:rPr lang="en-GB" dirty="0" smtClean="0"/>
-              <a:t>S</a:t>
-            </a:r>
-            <a:r>
-              <a:rPr lang="en-GB" dirty="0" smtClean="0"/>
-              <a:t>7</a:t>
+              <a:t>S7</a:t>
             </a:r>
             <a:endParaRPr lang="en-GB" dirty="0"/>
           </a:p>
@@ -3527,11 +3499,7 @@
             <a:pPr algn="ctr"/>
             <a:r>
               <a:rPr lang="en-GB" dirty="0" smtClean="0"/>
-              <a:t>S</a:t>
-            </a:r>
-            <a:r>
-              <a:rPr lang="en-GB" dirty="0" smtClean="0"/>
-              <a:t>8</a:t>
+              <a:t>S8</a:t>
             </a:r>
             <a:endParaRPr lang="en-GB" dirty="0"/>
           </a:p>
@@ -4208,11 +4176,7 @@
             <a:pPr algn="ctr"/>
             <a:r>
               <a:rPr lang="en-GB" dirty="0" smtClean="0"/>
-              <a:t>S</a:t>
-            </a:r>
-            <a:r>
-              <a:rPr lang="en-GB" dirty="0" smtClean="0"/>
-              <a:t>3</a:t>
+              <a:t>S3</a:t>
             </a:r>
             <a:endParaRPr lang="en-GB" dirty="0"/>
           </a:p>
@@ -4291,11 +4255,7 @@
             <a:pPr algn="ctr"/>
             <a:r>
               <a:rPr lang="en-GB" dirty="0" smtClean="0"/>
-              <a:t>L</a:t>
-            </a:r>
-            <a:r>
-              <a:rPr lang="en-GB" dirty="0" smtClean="0"/>
-              <a:t>2</a:t>
+              <a:t>L2</a:t>
             </a:r>
             <a:endParaRPr lang="en-GB" dirty="0"/>
           </a:p>

</xml_diff>